<commit_message>
Update Organigrama funcional de un centro de computo.pptx
ADD
</commit_message>
<xml_diff>
--- a/Organigrama funcional de un centro de computo.pptx
+++ b/Organigrama funcional de un centro de computo.pptx
@@ -2375,8 +2375,8 @@
         </p:nvSpPr>
         <p:spPr>
           <a:xfrm>
-            <a:off x="6067425" y="2189479"/>
-            <a:ext cx="548640" cy="289560"/>
+            <a:off x="6067424" y="2189479"/>
+            <a:ext cx="638175" cy="269304"/>
           </a:xfrm>
           <a:prstGeom prst="rect">
             <a:avLst/>
@@ -2426,7 +2426,7 @@
               </a:rPr>
               <a:t>de</a:t>
             </a:r>
-            <a:endParaRPr sz="900">
+            <a:endParaRPr sz="900" dirty="0">
               <a:latin typeface="Calibri"/>
               <a:cs typeface="Calibri"/>
             </a:endParaRPr>
@@ -2447,7 +2447,7 @@
               </a:rPr>
               <a:t>sistemas</a:t>
             </a:r>
-            <a:endParaRPr sz="900">
+            <a:endParaRPr sz="900" dirty="0">
               <a:latin typeface="Calibri"/>
               <a:cs typeface="Calibri"/>
             </a:endParaRPr>

</xml_diff>